<commit_message>
added funny pictures to pp
</commit_message>
<xml_diff>
--- a/Terraform101.pptx
+++ b/Terraform101.pptx
@@ -217,7 +217,7 @@
           <a:p>
             <a:fld id="{458B3470-95F1-4BD9-AFB4-529F3BDC56EE}" type="datetimeFigureOut">
               <a:rPr lang="sv-SE" smtClean="0"/>
-              <a:t>2023-02-07</a:t>
+              <a:t>2023-02-08</a:t>
             </a:fld>
             <a:endParaRPr lang="sv-SE"/>
           </a:p>
@@ -12348,7 +12348,7 @@
             </a:extLst>
           </p:cNvPr>
           <p:cNvSpPr>
-            <a:spLocks noGrp="1"/>
+            <a:spLocks noGrp="1" noRot="1" noMove="1" noResize="1" noEditPoints="1" noAdjustHandles="1" noChangeArrowheads="1" noChangeShapeType="1"/>
           </p:cNvSpPr>
           <p:nvPr>
             <p:ph type="pic" sz="quarter" idx="13"/>
@@ -12420,33 +12420,130 @@
           </a:p>
         </p:txBody>
       </p:sp>
-      <p:sp>
-        <p:nvSpPr>
-          <p:cNvPr id="5" name="Platshållare för text 4">
-            <a:extLst>
-              <a:ext uri="{FF2B5EF4-FFF2-40B4-BE49-F238E27FC236}">
-                <a16:creationId xmlns:a16="http://schemas.microsoft.com/office/drawing/2014/main" id="{704B33A7-650B-4F6C-8471-5756F8813898}"/>
-              </a:ext>
-            </a:extLst>
-          </p:cNvPr>
-          <p:cNvSpPr>
-            <a:spLocks noGrp="1"/>
-          </p:cNvSpPr>
-          <p:nvPr>
-            <p:ph type="body" sz="quarter" idx="14"/>
-          </p:nvPr>
-        </p:nvSpPr>
-        <p:spPr/>
-        <p:txBody>
-          <a:bodyPr>
-            <a:normAutofit/>
-          </a:bodyPr>
-          <a:lstStyle/>
-          <a:p>
-            <a:endParaRPr lang="sv-SE" dirty="0"/>
-          </a:p>
-        </p:txBody>
-      </p:sp>
+      <p:pic>
+        <p:nvPicPr>
+          <p:cNvPr id="1030" name="Picture 6" descr="Download Terraform Logo PNG and Vector (PDF, SVG, Ai, EPS) Free">
+            <a:extLst>
+              <a:ext uri="{FF2B5EF4-FFF2-40B4-BE49-F238E27FC236}">
+                <a16:creationId xmlns:a16="http://schemas.microsoft.com/office/drawing/2014/main" id="{8DC0A95F-E5DD-C916-6326-C27B5194EEB6}"/>
+              </a:ext>
+            </a:extLst>
+          </p:cNvPr>
+          <p:cNvPicPr>
+            <a:picLocks noChangeAspect="1" noChangeArrowheads="1"/>
+          </p:cNvPicPr>
+          <p:nvPr/>
+        </p:nvPicPr>
+        <p:blipFill>
+          <a:blip r:embed="rId2">
+            <a:extLst>
+              <a:ext uri="{28A0092B-C50C-407E-A947-70E740481C1C}">
+                <a14:useLocalDpi xmlns:a14="http://schemas.microsoft.com/office/drawing/2010/main" val="0"/>
+              </a:ext>
+            </a:extLst>
+          </a:blip>
+          <a:srcRect/>
+          <a:stretch>
+            <a:fillRect/>
+          </a:stretch>
+        </p:blipFill>
+        <p:spPr bwMode="auto">
+          <a:xfrm>
+            <a:off x="3868627" y="3106655"/>
+            <a:ext cx="4088987" cy="2652712"/>
+          </a:xfrm>
+          <a:prstGeom prst="rect">
+            <a:avLst/>
+          </a:prstGeom>
+          <a:noFill/>
+          <a:extLst>
+            <a:ext uri="{909E8E84-426E-40DD-AFC4-6F175D3DCCD1}">
+              <a14:hiddenFill xmlns:a14="http://schemas.microsoft.com/office/drawing/2010/main">
+                <a:solidFill>
+                  <a:srgbClr val="FFFFFF"/>
+                </a:solidFill>
+              </a14:hiddenFill>
+            </a:ext>
+          </a:extLst>
+        </p:spPr>
+      </p:pic>
+      <p:pic>
+        <p:nvPicPr>
+          <p:cNvPr id="14" name="Picture 8" descr="Profile photo for Linnéa Oxenwaldt">
+            <a:extLst>
+              <a:ext uri="{FF2B5EF4-FFF2-40B4-BE49-F238E27FC236}">
+                <a16:creationId xmlns:a16="http://schemas.microsoft.com/office/drawing/2014/main" id="{11E702C3-34D1-DC99-611E-8A58D58AD0E3}"/>
+              </a:ext>
+            </a:extLst>
+          </p:cNvPr>
+          <p:cNvPicPr>
+            <a:picLocks noChangeAspect="1" noChangeArrowheads="1"/>
+          </p:cNvPicPr>
+          <p:nvPr/>
+        </p:nvPicPr>
+        <p:blipFill>
+          <a:blip r:embed="rId3">
+            <a:extLst>
+              <a:ext uri="{28A0092B-C50C-407E-A947-70E740481C1C}">
+                <a14:useLocalDpi xmlns:a14="http://schemas.microsoft.com/office/drawing/2010/main" val="0"/>
+              </a:ext>
+            </a:extLst>
+          </a:blip>
+          <a:srcRect t="21875" b="21875"/>
+          <a:stretch>
+            <a:fillRect/>
+          </a:stretch>
+        </p:blipFill>
+        <p:spPr bwMode="auto">
+          <a:xfrm rot="19826550">
+            <a:off x="1685923" y="4386701"/>
+            <a:ext cx="2638425" cy="1484114"/>
+          </a:xfrm>
+          <a:prstGeom prst="rect">
+            <a:avLst/>
+          </a:prstGeom>
+          <a:noFill/>
+          <a:extLst>
+            <a:ext uri="{909E8E84-426E-40DD-AFC4-6F175D3DCCD1}">
+              <a14:hiddenFill xmlns:a14="http://schemas.microsoft.com/office/drawing/2010/main">
+                <a:solidFill>
+                  <a:srgbClr val="FFFFFF"/>
+                </a:solidFill>
+              </a14:hiddenFill>
+            </a:ext>
+          </a:extLst>
+        </p:spPr>
+      </p:pic>
+      <p:pic>
+        <p:nvPicPr>
+          <p:cNvPr id="18" name="Picture 17">
+            <a:extLst>
+              <a:ext uri="{FF2B5EF4-FFF2-40B4-BE49-F238E27FC236}">
+                <a16:creationId xmlns:a16="http://schemas.microsoft.com/office/drawing/2014/main" id="{56503FDD-1135-3B6D-5663-D3A115F16373}"/>
+              </a:ext>
+            </a:extLst>
+          </p:cNvPr>
+          <p:cNvPicPr>
+            <a:picLocks noChangeAspect="1"/>
+          </p:cNvPicPr>
+          <p:nvPr/>
+        </p:nvPicPr>
+        <p:blipFill>
+          <a:blip r:embed="rId4"/>
+          <a:stretch>
+            <a:fillRect/>
+          </a:stretch>
+        </p:blipFill>
+        <p:spPr>
+          <a:xfrm rot="2253011">
+            <a:off x="7055157" y="3037171"/>
+            <a:ext cx="2827865" cy="1590674"/>
+          </a:xfrm>
+          <a:prstGeom prst="rect">
+            <a:avLst/>
+          </a:prstGeom>
+        </p:spPr>
+      </p:pic>
     </p:spTree>
     <p:extLst>
       <p:ext uri="{BB962C8B-B14F-4D97-AF65-F5344CB8AC3E}">
@@ -12515,28 +12612,15 @@
           </a:p>
           <a:p>
             <a:r>
-              <a:rPr lang="sv-SE" dirty="0" err="1"/>
-              <a:t>Deployar</a:t>
-            </a:r>
-            <a:r>
               <a:rPr lang="sv-SE" dirty="0"/>
-              <a:t> infrastruktur från din lokala miljö</a:t>
-            </a:r>
-          </a:p>
-          <a:p>
-            <a:r>
-              <a:rPr lang="sv-SE" dirty="0" err="1"/>
-              <a:t>Deployar</a:t>
-            </a:r>
+              <a:t>Deploya infrastruktur från din lokala miljö</a:t>
+            </a:r>
+          </a:p>
+          <a:p>
             <a:r>
               <a:rPr lang="sv-SE" dirty="0"/>
-              <a:t> infrastruktur från en pipeline i </a:t>
-            </a:r>
-            <a:r>
-              <a:rPr lang="sv-SE" dirty="0" err="1"/>
-              <a:t>GitHub</a:t>
-            </a:r>
-            <a:endParaRPr lang="sv-SE" dirty="0"/>
+              <a:t>Deploya infrastruktur från en pipeline i GitHub</a:t>
+            </a:r>
           </a:p>
           <a:p>
             <a:r>
@@ -12554,31 +12638,6 @@
               <a:rPr lang="sv-SE" dirty="0"/>
               <a:t>Förbättrar säkerheten</a:t>
             </a:r>
-          </a:p>
-        </p:txBody>
-      </p:sp>
-      <p:sp>
-        <p:nvSpPr>
-          <p:cNvPr id="3" name="Underrubrik 2">
-            <a:extLst>
-              <a:ext uri="{FF2B5EF4-FFF2-40B4-BE49-F238E27FC236}">
-                <a16:creationId xmlns:a16="http://schemas.microsoft.com/office/drawing/2014/main" id="{804D1D3C-01BA-46E1-97F2-CD96352B807A}"/>
-              </a:ext>
-            </a:extLst>
-          </p:cNvPr>
-          <p:cNvSpPr>
-            <a:spLocks noGrp="1"/>
-          </p:cNvSpPr>
-          <p:nvPr>
-            <p:ph type="subTitle" idx="16"/>
-          </p:nvPr>
-        </p:nvSpPr>
-        <p:spPr/>
-        <p:txBody>
-          <a:bodyPr/>
-          <a:lstStyle/>
-          <a:p>
-            <a:endParaRPr lang="sv-SE" dirty="0"/>
           </a:p>
         </p:txBody>
       </p:sp>
@@ -15156,6 +15215,12 @@
 </file>
 
 <file path=customXml/item1.xml><?xml version="1.0" encoding="utf-8"?>
+<p:properties xmlns:p="http://schemas.microsoft.com/office/2006/metadata/properties" xmlns:xsi="http://www.w3.org/2001/XMLSchema-instance" xmlns:pc="http://schemas.microsoft.com/office/infopath/2007/PartnerControls">
+  <documentManagement/>
+</p:properties>
+</file>
+
+<file path=customXml/item2.xml><?xml version="1.0" encoding="utf-8"?>
 <ct:contentTypeSchema xmlns:ct="http://schemas.microsoft.com/office/2006/metadata/contentType" xmlns:ma="http://schemas.microsoft.com/office/2006/metadata/properties/metaAttributes" ct:_="" ma:_="" ma:contentTypeName="Document" ma:contentTypeID="0x010100D6CA2153213081418B7E14E4E1BF3C98" ma:contentTypeVersion="2" ma:contentTypeDescription="Create a new document." ma:contentTypeScope="" ma:versionID="03db4e3b3240684c23d48d70e0b6ed6a">
   <xsd:schema xmlns:xsd="http://www.w3.org/2001/XMLSchema" xmlns:xs="http://www.w3.org/2001/XMLSchema" xmlns:p="http://schemas.microsoft.com/office/2006/metadata/properties" xmlns:ns2="1965f72c-9ebc-4681-8fe0-9d8b479c414e" targetNamespace="http://schemas.microsoft.com/office/2006/metadata/properties" ma:root="true" ma:fieldsID="9ac48234fe16130c81fdbfe8bcc0218b" ns2:_="">
     <xsd:import namespace="1965f72c-9ebc-4681-8fe0-9d8b479c414e"/>
@@ -15287,12 +15352,6 @@
 </ct:contentTypeSchema>
 </file>
 
-<file path=customXml/item2.xml><?xml version="1.0" encoding="utf-8"?>
-<p:properties xmlns:p="http://schemas.microsoft.com/office/2006/metadata/properties" xmlns:xsi="http://www.w3.org/2001/XMLSchema-instance" xmlns:pc="http://schemas.microsoft.com/office/infopath/2007/PartnerControls">
-  <documentManagement/>
-</p:properties>
-</file>
-
 <file path=customXml/item3.xml><?xml version="1.0" encoding="utf-8"?>
 <?mso-contentType ?>
 <FormTemplates xmlns="http://schemas.microsoft.com/sharepoint/v3/contenttype/forms">
@@ -15303,6 +15362,15 @@
 </file>
 
 <file path=customXml/itemProps1.xml><?xml version="1.0" encoding="utf-8"?>
+<ds:datastoreItem xmlns:ds="http://schemas.openxmlformats.org/officeDocument/2006/customXml" ds:itemID="{5C56C71D-643B-4E04-9A6A-F76847701330}">
+  <ds:schemaRefs>
+    <ds:schemaRef ds:uri="http://schemas.microsoft.com/office/2006/metadata/properties"/>
+    <ds:schemaRef ds:uri="http://schemas.microsoft.com/office/infopath/2007/PartnerControls"/>
+  </ds:schemaRefs>
+</ds:datastoreItem>
+</file>
+
+<file path=customXml/itemProps2.xml><?xml version="1.0" encoding="utf-8"?>
 <ds:datastoreItem xmlns:ds="http://schemas.openxmlformats.org/officeDocument/2006/customXml" ds:itemID="{3C79E6B8-19A4-452C-B903-6FAB7AF44471}">
   <ds:schemaRefs>
     <ds:schemaRef ds:uri="http://schemas.microsoft.com/office/2006/metadata/contentType"/>
@@ -15320,15 +15388,6 @@
 </ds:datastoreItem>
 </file>
 
-<file path=customXml/itemProps2.xml><?xml version="1.0" encoding="utf-8"?>
-<ds:datastoreItem xmlns:ds="http://schemas.openxmlformats.org/officeDocument/2006/customXml" ds:itemID="{5C56C71D-643B-4E04-9A6A-F76847701330}">
-  <ds:schemaRefs>
-    <ds:schemaRef ds:uri="http://schemas.microsoft.com/office/2006/metadata/properties"/>
-    <ds:schemaRef ds:uri="http://schemas.microsoft.com/office/infopath/2007/PartnerControls"/>
-  </ds:schemaRefs>
-</ds:datastoreItem>
-</file>
-
 <file path=customXml/itemProps3.xml><?xml version="1.0" encoding="utf-8"?>
 <ds:datastoreItem xmlns:ds="http://schemas.openxmlformats.org/officeDocument/2006/customXml" ds:itemID="{DE89EAE4-F0DF-4056-A4B5-87C04EEE6F62}">
   <ds:schemaRefs>

</xml_diff>